<commit_message>
update to ui deployment, and readme
</commit_message>
<xml_diff>
--- a/docs/saga-diagrams.pptx
+++ b/docs/saga-diagrams.pptx
@@ -220,7 +220,7 @@
           <a:p>
             <a:fld id="{43B1B1F9-D0CB-FF4D-BEE0-BED1F1FDA196}" type="datetimeFigureOut">
               <a:rPr lang="en-US" smtClean="0"/>
-              <a:t>12/16/21</a:t>
+              <a:t>2/24/22</a:t>
             </a:fld>
             <a:endParaRPr lang="en-US"/>
           </a:p>
@@ -385,7 +385,7 @@
           <a:p>
             <a:fld id="{26BE012A-D992-5D42-B86E-AA2BC0764EE1}" type="datetimeFigureOut">
               <a:rPr lang="en-US" smtClean="0"/>
-              <a:t>12/16/21</a:t>
+              <a:t>2/24/22</a:t>
             </a:fld>
             <a:endParaRPr lang="en-US"/>
           </a:p>
@@ -3609,14 +3609,14 @@
           </a:ln>
           <a:extLst>
             <a:ext uri="{909E8E84-426E-40dd-AFC4-6F175D3DCCD1}">
-              <a14:hiddenFill xmlns="" xmlns:a14="http://schemas.microsoft.com/office/drawing/2010/main">
+              <a14:hiddenFill xmlns:a14="http://schemas.microsoft.com/office/drawing/2010/main" xmlns="">
                 <a:solidFill>
                   <a:srgbClr val="FFFFFF"/>
                 </a:solidFill>
               </a14:hiddenFill>
             </a:ext>
             <a:ext uri="{91240B29-F687-4f45-9708-019B960494DF}">
-              <a14:hiddenLine xmlns="" xmlns:a14="http://schemas.microsoft.com/office/drawing/2010/main" w="9525">
+              <a14:hiddenLine xmlns:a14="http://schemas.microsoft.com/office/drawing/2010/main" xmlns="" w="9525">
                 <a:solidFill>
                   <a:srgbClr val="000000"/>
                 </a:solidFill>
@@ -3668,14 +3668,14 @@
           <a:effectLst/>
           <a:extLst>
             <a:ext uri="{909E8E84-426E-40dd-AFC4-6F175D3DCCD1}">
-              <a14:hiddenFill xmlns="" xmlns:a14="http://schemas.microsoft.com/office/drawing/2010/main">
+              <a14:hiddenFill xmlns:a14="http://schemas.microsoft.com/office/drawing/2010/main" xmlns="">
                 <a:solidFill>
                   <a:schemeClr val="accent1"/>
                 </a:solidFill>
               </a14:hiddenFill>
             </a:ext>
             <a:ext uri="{91240B29-F687-4f45-9708-019B960494DF}">
-              <a14:hiddenLine xmlns="" xmlns:a14="http://schemas.microsoft.com/office/drawing/2010/main" w="9525">
+              <a14:hiddenLine xmlns:a14="http://schemas.microsoft.com/office/drawing/2010/main" xmlns="" w="9525">
                 <a:solidFill>
                   <a:schemeClr val="tx1"/>
                 </a:solidFill>
@@ -3685,7 +3685,7 @@
               </a14:hiddenLine>
             </a:ext>
             <a:ext uri="{AF507438-7753-43e0-B8FC-AC1667EBCBE1}">
-              <a14:hiddenEffects xmlns="" xmlns:a14="http://schemas.microsoft.com/office/drawing/2010/main">
+              <a14:hiddenEffects xmlns:a14="http://schemas.microsoft.com/office/drawing/2010/main" xmlns="">
                 <a:effectLst>
                   <a:outerShdw blurRad="63500" dist="38099" dir="2700000" algn="ctr" rotWithShape="0">
                     <a:schemeClr val="bg2">
@@ -4455,10 +4455,10 @@
           </a:ln>
           <a:extLst>
             <a:ext uri="{FAA26D3D-D897-4be2-8F04-BA451C77F1D7}">
-              <ma14:placeholderFlag xmlns:ma14="http://schemas.microsoft.com/office/mac/drawingml/2011/main" xmlns="" val="1"/>
+              <ma14:placeholderFlag xmlns="" xmlns:ma14="http://schemas.microsoft.com/office/mac/drawingml/2011/main" val="1"/>
             </a:ext>
             <a:ext uri="{909E8E84-426E-40dd-AFC4-6F175D3DCCD1}">
-              <a14:hiddenFill xmlns:a14="http://schemas.microsoft.com/office/drawing/2010/main" xmlns="">
+              <a14:hiddenFill xmlns="" xmlns:a14="http://schemas.microsoft.com/office/drawing/2010/main">
                 <a:solidFill>
                   <a:srgbClr val="FFFFFF"/>
                 </a:solidFill>
@@ -4509,10 +4509,10 @@
           </a:ln>
           <a:extLst>
             <a:ext uri="{FAA26D3D-D897-4be2-8F04-BA451C77F1D7}">
-              <ma14:placeholderFlag xmlns:ma14="http://schemas.microsoft.com/office/mac/drawingml/2011/main" xmlns="" val="1"/>
+              <ma14:placeholderFlag xmlns="" xmlns:ma14="http://schemas.microsoft.com/office/mac/drawingml/2011/main" val="1"/>
             </a:ext>
             <a:ext uri="{909E8E84-426E-40dd-AFC4-6F175D3DCCD1}">
-              <a14:hiddenFill xmlns:a14="http://schemas.microsoft.com/office/drawing/2010/main" xmlns="">
+              <a14:hiddenFill xmlns="" xmlns:a14="http://schemas.microsoft.com/office/drawing/2010/main">
                 <a:solidFill>
                   <a:srgbClr val="FFFFFF"/>
                 </a:solidFill>
@@ -12017,8 +12017,8 @@
         </p:nvSpPr>
         <p:spPr bwMode="auto">
           <a:xfrm>
-            <a:off x="2850595" y="1261690"/>
-            <a:ext cx="1616414" cy="2586873"/>
+            <a:off x="2843228" y="1097280"/>
+            <a:ext cx="1623781" cy="2109977"/>
           </a:xfrm>
           <a:prstGeom prst="roundRect">
             <a:avLst>
@@ -12113,7 +12113,7 @@
         </p:nvSpPr>
         <p:spPr bwMode="auto">
           <a:xfrm>
-            <a:off x="2940224" y="4168644"/>
+            <a:off x="2916734" y="3973931"/>
             <a:ext cx="184171" cy="548634"/>
           </a:xfrm>
           <a:prstGeom prst="roundRect">
@@ -12195,7 +12195,7 @@
         </p:nvSpPr>
         <p:spPr bwMode="auto">
           <a:xfrm>
-            <a:off x="3123102" y="4168644"/>
+            <a:off x="3099612" y="3973931"/>
             <a:ext cx="184171" cy="548634"/>
           </a:xfrm>
           <a:prstGeom prst="roundRect">
@@ -12277,7 +12277,7 @@
         </p:nvSpPr>
         <p:spPr bwMode="auto">
           <a:xfrm>
-            <a:off x="3307273" y="4168644"/>
+            <a:off x="3283783" y="3973931"/>
             <a:ext cx="184171" cy="548634"/>
           </a:xfrm>
           <a:prstGeom prst="roundRect">
@@ -12359,7 +12359,7 @@
         </p:nvSpPr>
         <p:spPr bwMode="auto">
           <a:xfrm>
-            <a:off x="3490151" y="4168644"/>
+            <a:off x="3466661" y="3973931"/>
             <a:ext cx="184171" cy="548634"/>
           </a:xfrm>
           <a:prstGeom prst="roundRect">
@@ -12441,7 +12441,7 @@
         </p:nvSpPr>
         <p:spPr bwMode="auto">
           <a:xfrm>
-            <a:off x="3674322" y="4168644"/>
+            <a:off x="3650832" y="3973931"/>
             <a:ext cx="184171" cy="548634"/>
           </a:xfrm>
           <a:prstGeom prst="roundRect">
@@ -12523,7 +12523,7 @@
         </p:nvSpPr>
         <p:spPr bwMode="auto">
           <a:xfrm>
-            <a:off x="3861101" y="4168644"/>
+            <a:off x="3837611" y="3973931"/>
             <a:ext cx="184171" cy="548634"/>
           </a:xfrm>
           <a:prstGeom prst="roundRect">
@@ -12605,7 +12605,7 @@
         </p:nvSpPr>
         <p:spPr bwMode="auto">
           <a:xfrm>
-            <a:off x="4041371" y="4168644"/>
+            <a:off x="4017881" y="3973931"/>
             <a:ext cx="184171" cy="548634"/>
           </a:xfrm>
           <a:prstGeom prst="roundRect">
@@ -12687,7 +12687,7 @@
         </p:nvSpPr>
         <p:spPr bwMode="auto">
           <a:xfrm>
-            <a:off x="4221641" y="4168644"/>
+            <a:off x="4198151" y="3973931"/>
             <a:ext cx="184171" cy="548634"/>
           </a:xfrm>
           <a:prstGeom prst="roundRect">
@@ -12769,7 +12769,7 @@
         </p:nvSpPr>
         <p:spPr>
           <a:xfrm>
-            <a:off x="2910329" y="4685229"/>
+            <a:off x="2886839" y="4490516"/>
             <a:ext cx="582211" cy="248209"/>
           </a:xfrm>
           <a:prstGeom prst="rect">
@@ -12815,7 +12815,7 @@
         <p:spPr>
           <a:xfrm>
             <a:off x="235480" y="1533273"/>
-            <a:ext cx="2255361" cy="2333804"/>
+            <a:ext cx="2255361" cy="1931822"/>
           </a:xfrm>
           <a:prstGeom prst="rect">
             <a:avLst/>
@@ -12880,8 +12880,8 @@
         </p:nvSpPr>
         <p:spPr>
           <a:xfrm>
-            <a:off x="1380175" y="1871144"/>
-            <a:ext cx="1021929" cy="1884747"/>
+            <a:off x="1380175" y="1871145"/>
+            <a:ext cx="984183" cy="1449572"/>
           </a:xfrm>
           <a:prstGeom prst="roundRect">
             <a:avLst/>
@@ -12956,8 +12956,8 @@
         </p:nvCxnSpPr>
         <p:spPr>
           <a:xfrm flipV="1">
-            <a:off x="2402104" y="1659365"/>
-            <a:ext cx="662152" cy="1154153"/>
+            <a:off x="2364358" y="1659365"/>
+            <a:ext cx="699898" cy="936566"/>
           </a:xfrm>
           <a:prstGeom prst="bentConnector3">
             <a:avLst>
@@ -13201,8 +13201,8 @@
         </p:nvCxnSpPr>
         <p:spPr>
           <a:xfrm rot="16200000" flipH="1">
-            <a:off x="2896057" y="2750973"/>
-            <a:ext cx="412753" cy="2422587"/>
+            <a:off x="2754645" y="2438339"/>
+            <a:ext cx="653214" cy="2417970"/>
           </a:xfrm>
           <a:prstGeom prst="bentConnector3">
             <a:avLst>
@@ -13329,34 +13329,73 @@
       </p:sp>
       <p:sp>
         <p:nvSpPr>
-          <p:cNvPr id="42" name="Rectangle 41">
-            <a:extLst>
-              <a:ext uri="{FF2B5EF4-FFF2-40B4-BE49-F238E27FC236}">
-                <a16:creationId xmlns:a16="http://schemas.microsoft.com/office/drawing/2014/main" id="{851CC15B-4B2A-9C42-B76B-278A16AED9E3}"/>
-              </a:ext>
-            </a:extLst>
-          </p:cNvPr>
-          <p:cNvSpPr/>
-          <p:nvPr/>
-        </p:nvSpPr>
-        <p:spPr>
-          <a:xfrm>
-            <a:off x="7526811" y="1295421"/>
-            <a:ext cx="884874" cy="727693"/>
+          <p:cNvPr id="9" name="TextBox 8">
+            <a:extLst>
+              <a:ext uri="{FF2B5EF4-FFF2-40B4-BE49-F238E27FC236}">
+                <a16:creationId xmlns:a16="http://schemas.microsoft.com/office/drawing/2014/main" id="{6F7C97B9-5063-2142-B6AE-C018EA52555E}"/>
+              </a:ext>
+            </a:extLst>
+          </p:cNvPr>
+          <p:cNvSpPr txBox="1"/>
+          <p:nvPr/>
+        </p:nvSpPr>
+        <p:spPr>
+          <a:xfrm>
+            <a:off x="1389801" y="1733151"/>
+            <a:ext cx="963054" cy="246221"/>
           </a:xfrm>
           <a:prstGeom prst="rect">
             <a:avLst/>
           </a:prstGeom>
-          <a:ln>
-            <a:noFill/>
-          </a:ln>
-          <a:effectLst>
-            <a:outerShdw blurRad="50800" dist="38100" dir="5400000" algn="t" rotWithShape="0">
-              <a:prstClr val="black">
-                <a:alpha val="40000"/>
-              </a:prstClr>
-            </a:outerShdw>
-          </a:effectLst>
+          <a:solidFill>
+            <a:schemeClr val="bg1"/>
+          </a:solidFill>
+        </p:spPr>
+        <p:txBody>
+          <a:bodyPr wrap="square" rtlCol="0">
+            <a:spAutoFit/>
+          </a:bodyPr>
+          <a:lstStyle/>
+          <a:p>
+            <a:pPr defTabSz="685783"/>
+            <a:r>
+              <a:rPr lang="en-US" sz="1000" dirty="0">
+                <a:solidFill>
+                  <a:prstClr val="black"/>
+                </a:solidFill>
+                <a:latin typeface="Arial"/>
+              </a:rPr>
+              <a:t>startSagaAPI</a:t>
+            </a:r>
+          </a:p>
+        </p:txBody>
+      </p:sp>
+      <p:sp>
+        <p:nvSpPr>
+          <p:cNvPr id="55" name="Can 54">
+            <a:extLst>
+              <a:ext uri="{FF2B5EF4-FFF2-40B4-BE49-F238E27FC236}">
+                <a16:creationId xmlns:a16="http://schemas.microsoft.com/office/drawing/2014/main" id="{A304A719-8383-C348-9CB2-685CDCF0C3DD}"/>
+              </a:ext>
+            </a:extLst>
+          </p:cNvPr>
+          <p:cNvSpPr/>
+          <p:nvPr/>
+        </p:nvSpPr>
+        <p:spPr>
+          <a:xfrm>
+            <a:off x="379023" y="3175196"/>
+            <a:ext cx="487691" cy="535098"/>
+          </a:xfrm>
+          <a:prstGeom prst="can">
+            <a:avLst/>
+          </a:prstGeom>
+          <a:solidFill>
+            <a:schemeClr val="accent6">
+              <a:lumMod val="60000"/>
+              <a:lumOff val="40000"/>
+            </a:schemeClr>
+          </a:solidFill>
         </p:spPr>
         <p:style>
           <a:lnRef idx="2">
@@ -13375,300 +13414,6 @@
           </a:fontRef>
         </p:style>
         <p:txBody>
-          <a:bodyPr rtlCol="0" anchor="t"/>
-          <a:lstStyle/>
-          <a:p>
-            <a:pPr defTabSz="685783">
-              <a:defRPr/>
-            </a:pPr>
-            <a:r>
-              <a:rPr lang="en-US" sz="900" dirty="0">
-                <a:solidFill>
-                  <a:prstClr val="white"/>
-                </a:solidFill>
-                <a:latin typeface="Arial"/>
-              </a:rPr>
-              <a:t>Invoice MS</a:t>
-            </a:r>
-          </a:p>
-        </p:txBody>
-      </p:sp>
-      <p:sp>
-        <p:nvSpPr>
-          <p:cNvPr id="52" name="TextBox 51">
-            <a:extLst>
-              <a:ext uri="{FF2B5EF4-FFF2-40B4-BE49-F238E27FC236}">
-                <a16:creationId xmlns:a16="http://schemas.microsoft.com/office/drawing/2014/main" id="{C18A98C9-020E-FF4A-A32E-5B7B06BB7494}"/>
-              </a:ext>
-            </a:extLst>
-          </p:cNvPr>
-          <p:cNvSpPr txBox="1"/>
-          <p:nvPr/>
-        </p:nvSpPr>
-        <p:spPr>
-          <a:xfrm>
-            <a:off x="2988147" y="2888793"/>
-            <a:ext cx="1273105" cy="248209"/>
-          </a:xfrm>
-          <a:prstGeom prst="rect">
-            <a:avLst/>
-          </a:prstGeom>
-          <a:noFill/>
-        </p:spPr>
-        <p:txBody>
-          <a:bodyPr wrap="none" rtlCol="0">
-            <a:spAutoFit/>
-          </a:bodyPr>
-          <a:lstStyle/>
-          <a:p>
-            <a:pPr defTabSz="685783">
-              <a:defRPr/>
-            </a:pPr>
-            <a:r>
-              <a:rPr lang="en-US" sz="1013" dirty="0">
-                <a:solidFill>
-                  <a:srgbClr val="4178BE">
-                    <a:lumMod val="25000"/>
-                  </a:srgbClr>
-                </a:solidFill>
-                <a:latin typeface="Arial"/>
-              </a:rPr>
-              <a:t>Invoice commands</a:t>
-            </a:r>
-          </a:p>
-        </p:txBody>
-      </p:sp>
-      <p:cxnSp>
-        <p:nvCxnSpPr>
-          <p:cNvPr id="54" name="Elbow Connector 53">
-            <a:extLst>
-              <a:ext uri="{FF2B5EF4-FFF2-40B4-BE49-F238E27FC236}">
-                <a16:creationId xmlns:a16="http://schemas.microsoft.com/office/drawing/2014/main" id="{15BEED0E-BEF0-0241-B41F-1C1EEA39C582}"/>
-              </a:ext>
-            </a:extLst>
-          </p:cNvPr>
-          <p:cNvCxnSpPr>
-            <a:cxnSpLocks/>
-            <a:stCxn id="68" idx="3"/>
-            <a:endCxn id="42" idx="2"/>
-          </p:cNvCxnSpPr>
-          <p:nvPr/>
-        </p:nvCxnSpPr>
-        <p:spPr>
-          <a:xfrm flipV="1">
-            <a:off x="3523224" y="2023114"/>
-            <a:ext cx="4446024" cy="1268783"/>
-          </a:xfrm>
-          <a:prstGeom prst="bentConnector2">
-            <a:avLst/>
-          </a:prstGeom>
-          <a:ln w="12700">
-            <a:solidFill>
-              <a:srgbClr val="00B050"/>
-            </a:solidFill>
-            <a:prstDash val="sysDot"/>
-            <a:tailEnd type="triangle"/>
-          </a:ln>
-        </p:spPr>
-        <p:style>
-          <a:lnRef idx="1">
-            <a:schemeClr val="accent1"/>
-          </a:lnRef>
-          <a:fillRef idx="0">
-            <a:schemeClr val="accent1"/>
-          </a:fillRef>
-          <a:effectRef idx="0">
-            <a:schemeClr val="accent1"/>
-          </a:effectRef>
-          <a:fontRef idx="minor">
-            <a:schemeClr val="tx1"/>
-          </a:fontRef>
-        </p:style>
-      </p:cxnSp>
-      <p:cxnSp>
-        <p:nvCxnSpPr>
-          <p:cNvPr id="58" name="Elbow Connector 57">
-            <a:extLst>
-              <a:ext uri="{FF2B5EF4-FFF2-40B4-BE49-F238E27FC236}">
-                <a16:creationId xmlns:a16="http://schemas.microsoft.com/office/drawing/2014/main" id="{548C47B7-9D12-7E4A-9AF7-B3248B353F52}"/>
-              </a:ext>
-            </a:extLst>
-          </p:cNvPr>
-          <p:cNvCxnSpPr>
-            <a:cxnSpLocks/>
-            <a:stCxn id="42" idx="2"/>
-            <a:endCxn id="69" idx="3"/>
-          </p:cNvCxnSpPr>
-          <p:nvPr/>
-        </p:nvCxnSpPr>
-        <p:spPr>
-          <a:xfrm rot="5400000">
-            <a:off x="5229542" y="757920"/>
-            <a:ext cx="1474513" cy="4004900"/>
-          </a:xfrm>
-          <a:prstGeom prst="bentConnector2">
-            <a:avLst/>
-          </a:prstGeom>
-          <a:ln w="12700">
-            <a:solidFill>
-              <a:srgbClr val="7030A0"/>
-            </a:solidFill>
-            <a:prstDash val="sysDot"/>
-            <a:tailEnd type="triangle"/>
-          </a:ln>
-        </p:spPr>
-        <p:style>
-          <a:lnRef idx="1">
-            <a:schemeClr val="accent1"/>
-          </a:lnRef>
-          <a:fillRef idx="0">
-            <a:schemeClr val="accent1"/>
-          </a:fillRef>
-          <a:effectRef idx="0">
-            <a:schemeClr val="accent1"/>
-          </a:effectRef>
-          <a:fontRef idx="minor">
-            <a:schemeClr val="tx1"/>
-          </a:fontRef>
-        </p:style>
-      </p:cxnSp>
-      <p:cxnSp>
-        <p:nvCxnSpPr>
-          <p:cNvPr id="48" name="Elbow Connector 47">
-            <a:extLst>
-              <a:ext uri="{FF2B5EF4-FFF2-40B4-BE49-F238E27FC236}">
-                <a16:creationId xmlns:a16="http://schemas.microsoft.com/office/drawing/2014/main" id="{0DF6327C-C8A4-6948-94A6-CC10D64E49E8}"/>
-              </a:ext>
-            </a:extLst>
-          </p:cNvPr>
-          <p:cNvCxnSpPr>
-            <a:cxnSpLocks/>
-            <a:stCxn id="47" idx="3"/>
-            <a:endCxn id="68" idx="1"/>
-          </p:cNvCxnSpPr>
-          <p:nvPr/>
-        </p:nvCxnSpPr>
-        <p:spPr>
-          <a:xfrm>
-            <a:off x="2402104" y="2813518"/>
-            <a:ext cx="736633" cy="478379"/>
-          </a:xfrm>
-          <a:prstGeom prst="bentConnector3">
-            <a:avLst>
-              <a:gd name="adj1" fmla="val 50000"/>
-            </a:avLst>
-          </a:prstGeom>
-          <a:ln w="12700">
-            <a:solidFill>
-              <a:schemeClr val="accent6"/>
-            </a:solidFill>
-            <a:prstDash val="sysDash"/>
-            <a:tailEnd type="triangle"/>
-          </a:ln>
-          <a:effectLst/>
-        </p:spPr>
-        <p:style>
-          <a:lnRef idx="2">
-            <a:schemeClr val="accent1"/>
-          </a:lnRef>
-          <a:fillRef idx="0">
-            <a:schemeClr val="accent1"/>
-          </a:fillRef>
-          <a:effectRef idx="1">
-            <a:schemeClr val="accent1"/>
-          </a:effectRef>
-          <a:fontRef idx="minor">
-            <a:schemeClr val="tx1"/>
-          </a:fontRef>
-        </p:style>
-      </p:cxnSp>
-      <p:sp>
-        <p:nvSpPr>
-          <p:cNvPr id="9" name="TextBox 8">
-            <a:extLst>
-              <a:ext uri="{FF2B5EF4-FFF2-40B4-BE49-F238E27FC236}">
-                <a16:creationId xmlns:a16="http://schemas.microsoft.com/office/drawing/2014/main" id="{6F7C97B9-5063-2142-B6AE-C018EA52555E}"/>
-              </a:ext>
-            </a:extLst>
-          </p:cNvPr>
-          <p:cNvSpPr txBox="1"/>
-          <p:nvPr/>
-        </p:nvSpPr>
-        <p:spPr>
-          <a:xfrm>
-            <a:off x="1408358" y="1723526"/>
-            <a:ext cx="934871" cy="246221"/>
-          </a:xfrm>
-          <a:prstGeom prst="rect">
-            <a:avLst/>
-          </a:prstGeom>
-          <a:solidFill>
-            <a:schemeClr val="bg1"/>
-          </a:solidFill>
-        </p:spPr>
-        <p:txBody>
-          <a:bodyPr wrap="none" rtlCol="0">
-            <a:spAutoFit/>
-          </a:bodyPr>
-          <a:lstStyle/>
-          <a:p>
-            <a:pPr defTabSz="685783"/>
-            <a:r>
-              <a:rPr lang="en-US" sz="1000" dirty="0">
-                <a:solidFill>
-                  <a:prstClr val="black"/>
-                </a:solidFill>
-                <a:latin typeface="Arial"/>
-              </a:rPr>
-              <a:t>startSagaAPI</a:t>
-            </a:r>
-          </a:p>
-        </p:txBody>
-      </p:sp>
-      <p:sp>
-        <p:nvSpPr>
-          <p:cNvPr id="55" name="Can 54">
-            <a:extLst>
-              <a:ext uri="{FF2B5EF4-FFF2-40B4-BE49-F238E27FC236}">
-                <a16:creationId xmlns:a16="http://schemas.microsoft.com/office/drawing/2014/main" id="{A304A719-8383-C348-9CB2-685CDCF0C3DD}"/>
-              </a:ext>
-            </a:extLst>
-          </p:cNvPr>
-          <p:cNvSpPr/>
-          <p:nvPr/>
-        </p:nvSpPr>
-        <p:spPr>
-          <a:xfrm>
-            <a:off x="344263" y="3848563"/>
-            <a:ext cx="487691" cy="535098"/>
-          </a:xfrm>
-          <a:prstGeom prst="can">
-            <a:avLst/>
-          </a:prstGeom>
-          <a:solidFill>
-            <a:schemeClr val="accent6">
-              <a:lumMod val="60000"/>
-              <a:lumOff val="40000"/>
-            </a:schemeClr>
-          </a:solidFill>
-        </p:spPr>
-        <p:style>
-          <a:lnRef idx="2">
-            <a:schemeClr val="accent1">
-              <a:shade val="50000"/>
-            </a:schemeClr>
-          </a:lnRef>
-          <a:fillRef idx="1">
-            <a:schemeClr val="accent1"/>
-          </a:fillRef>
-          <a:effectRef idx="0">
-            <a:schemeClr val="accent1"/>
-          </a:effectRef>
-          <a:fontRef idx="minor">
-            <a:schemeClr val="lt1"/>
-          </a:fontRef>
-        </p:style>
-        <p:txBody>
           <a:bodyPr rtlCol="0" anchor="ctr"/>
           <a:lstStyle/>
           <a:p>
@@ -13816,72 +13561,6 @@
       </p:pic>
       <p:pic>
         <p:nvPicPr>
-          <p:cNvPr id="68" name="Picture 31" descr="Picture 31">
-            <a:extLst>
-              <a:ext uri="{FF2B5EF4-FFF2-40B4-BE49-F238E27FC236}">
-                <a16:creationId xmlns:a16="http://schemas.microsoft.com/office/drawing/2014/main" id="{BA5E541C-5437-0742-BEDA-185A819FF7C4}"/>
-              </a:ext>
-            </a:extLst>
-          </p:cNvPr>
-          <p:cNvPicPr>
-            <a:picLocks noChangeAspect="1"/>
-          </p:cNvPicPr>
-          <p:nvPr/>
-        </p:nvPicPr>
-        <p:blipFill>
-          <a:blip r:embed="rId3"/>
-          <a:stretch>
-            <a:fillRect/>
-          </a:stretch>
-        </p:blipFill>
-        <p:spPr>
-          <a:xfrm>
-            <a:off x="3138737" y="3159573"/>
-            <a:ext cx="384487" cy="264647"/>
-          </a:xfrm>
-          <a:prstGeom prst="rect">
-            <a:avLst/>
-          </a:prstGeom>
-          <a:ln w="12700">
-            <a:miter lim="400000"/>
-          </a:ln>
-        </p:spPr>
-      </p:pic>
-      <p:pic>
-        <p:nvPicPr>
-          <p:cNvPr id="69" name="Picture 31" descr="Picture 31">
-            <a:extLst>
-              <a:ext uri="{FF2B5EF4-FFF2-40B4-BE49-F238E27FC236}">
-                <a16:creationId xmlns:a16="http://schemas.microsoft.com/office/drawing/2014/main" id="{076541D9-8F84-5B4E-8B08-4018489634AC}"/>
-              </a:ext>
-            </a:extLst>
-          </p:cNvPr>
-          <p:cNvPicPr>
-            <a:picLocks noChangeAspect="1"/>
-          </p:cNvPicPr>
-          <p:nvPr/>
-        </p:nvPicPr>
-        <p:blipFill>
-          <a:blip r:embed="rId3"/>
-          <a:stretch>
-            <a:fillRect/>
-          </a:stretch>
-        </p:blipFill>
-        <p:spPr>
-          <a:xfrm>
-            <a:off x="3579861" y="3365303"/>
-            <a:ext cx="384487" cy="264647"/>
-          </a:xfrm>
-          <a:prstGeom prst="rect">
-            <a:avLst/>
-          </a:prstGeom>
-          <a:ln w="12700">
-            <a:miter lim="400000"/>
-          </a:ln>
-        </p:spPr>
-      </p:pic>
-      <p:pic>
-        <p:nvPicPr>
           <p:cNvPr id="70" name="Picture 69">
             <a:extLst>
               <a:ext uri="{FF2B5EF4-FFF2-40B4-BE49-F238E27FC236}">
@@ -13902,7 +13581,7 @@
         </p:blipFill>
         <p:spPr>
           <a:xfrm>
-            <a:off x="2904796" y="3599242"/>
+            <a:off x="2857228" y="2925874"/>
             <a:ext cx="187778" cy="249322"/>
           </a:xfrm>
           <a:prstGeom prst="rect">
@@ -13934,7 +13613,7 @@
         </p:nvSpPr>
         <p:spPr bwMode="auto">
           <a:xfrm>
-            <a:off x="2827687" y="4076864"/>
+            <a:off x="2804197" y="3882151"/>
             <a:ext cx="3019062" cy="856574"/>
           </a:xfrm>
           <a:prstGeom prst="roundRect">
@@ -13999,7 +13678,7 @@
         </p:blipFill>
         <p:spPr>
           <a:xfrm>
-            <a:off x="5610035" y="4666517"/>
+            <a:off x="5586545" y="4471804"/>
             <a:ext cx="236714" cy="312615"/>
           </a:xfrm>
           <a:prstGeom prst="rect">
@@ -15924,7 +15603,25 @@
                 </a:solidFill>
                 <a:latin typeface="Arial"/>
               </a:rPr>
-              <a:t>Freezer  knative MS</a:t>
+              <a:t>Freezer  </a:t>
+            </a:r>
+            <a:r>
+              <a:rPr lang="en-US" sz="900" dirty="0" err="1">
+                <a:solidFill>
+                  <a:prstClr val="white"/>
+                </a:solidFill>
+                <a:latin typeface="Arial"/>
+              </a:rPr>
+              <a:t>knative</a:t>
+            </a:r>
+            <a:r>
+              <a:rPr lang="en-US" sz="900" dirty="0">
+                <a:solidFill>
+                  <a:prstClr val="white"/>
+                </a:solidFill>
+                <a:latin typeface="Arial"/>
+              </a:rPr>
+              <a:t> MS</a:t>
             </a:r>
           </a:p>
         </p:txBody>
@@ -15984,13 +15681,22 @@
               <a:defRPr/>
             </a:pPr>
             <a:r>
+              <a:rPr lang="en-US" sz="900" dirty="0" err="1">
+                <a:solidFill>
+                  <a:prstClr val="white"/>
+                </a:solidFill>
+                <a:latin typeface="Arial"/>
+              </a:rPr>
+              <a:t>knative</a:t>
+            </a:r>
+            <a:r>
               <a:rPr lang="en-US" sz="900" dirty="0">
                 <a:solidFill>
                   <a:prstClr val="white"/>
                 </a:solidFill>
                 <a:latin typeface="Arial"/>
               </a:rPr>
-              <a:t>knative MQ Source</a:t>
+              <a:t> MQ Source</a:t>
             </a:r>
           </a:p>
         </p:txBody>

</xml_diff>